<commit_message>
Add missing note about gitignore on windows
</commit_message>
<xml_diff>
--- a/Presentations/8.TeamWorkAndGit.pptx
+++ b/Presentations/8.TeamWorkAndGit.pptx
@@ -12627,7 +12627,7 @@
           <a:p>
             <a:fld id="{5365F620-2651-4EE7-A021-86DCF70839ED}" type="datetimeFigureOut">
               <a:rPr lang="en-US" smtClean="0"/>
-              <a:t>13-Sep-17</a:t>
+              <a:t>15-Sep-17</a:t>
             </a:fld>
             <a:endParaRPr lang="en-US"/>
           </a:p>
@@ -13209,7 +13209,7 @@
           <a:p>
             <a:fld id="{3782CE92-F9D3-4EB2-AD9D-26F7FF2DF595}" type="datetimeFigureOut">
               <a:rPr lang="en-US" smtClean="0"/>
-              <a:t>13-Sep-17</a:t>
+              <a:t>15-Sep-17</a:t>
             </a:fld>
             <a:endParaRPr lang="en-US"/>
           </a:p>
@@ -13407,7 +13407,7 @@
           <a:p>
             <a:fld id="{3782CE92-F9D3-4EB2-AD9D-26F7FF2DF595}" type="datetimeFigureOut">
               <a:rPr lang="en-US" smtClean="0"/>
-              <a:t>13-Sep-17</a:t>
+              <a:t>15-Sep-17</a:t>
             </a:fld>
             <a:endParaRPr lang="en-US"/>
           </a:p>
@@ -13615,7 +13615,7 @@
           <a:p>
             <a:fld id="{3782CE92-F9D3-4EB2-AD9D-26F7FF2DF595}" type="datetimeFigureOut">
               <a:rPr lang="en-US" smtClean="0"/>
-              <a:t>13-Sep-17</a:t>
+              <a:t>15-Sep-17</a:t>
             </a:fld>
             <a:endParaRPr lang="en-US"/>
           </a:p>
@@ -13819,7 +13819,7 @@
           <a:p>
             <a:fld id="{3782CE92-F9D3-4EB2-AD9D-26F7FF2DF595}" type="datetimeFigureOut">
               <a:rPr lang="en-US" smtClean="0"/>
-              <a:t>13-Sep-17</a:t>
+              <a:t>15-Sep-17</a:t>
             </a:fld>
             <a:endParaRPr lang="en-US"/>
           </a:p>
@@ -13989,7 +13989,7 @@
           <a:p>
             <a:fld id="{3782CE92-F9D3-4EB2-AD9D-26F7FF2DF595}" type="datetimeFigureOut">
               <a:rPr lang="en-US" smtClean="0"/>
-              <a:t>13-Sep-17</a:t>
+              <a:t>15-Sep-17</a:t>
             </a:fld>
             <a:endParaRPr lang="en-US"/>
           </a:p>
@@ -14235,7 +14235,7 @@
           <a:p>
             <a:fld id="{3782CE92-F9D3-4EB2-AD9D-26F7FF2DF595}" type="datetimeFigureOut">
               <a:rPr lang="en-US" smtClean="0"/>
-              <a:t>13-Sep-17</a:t>
+              <a:t>15-Sep-17</a:t>
             </a:fld>
             <a:endParaRPr lang="en-US"/>
           </a:p>
@@ -14467,7 +14467,7 @@
           <a:p>
             <a:fld id="{3782CE92-F9D3-4EB2-AD9D-26F7FF2DF595}" type="datetimeFigureOut">
               <a:rPr lang="en-US" smtClean="0"/>
-              <a:t>13-Sep-17</a:t>
+              <a:t>15-Sep-17</a:t>
             </a:fld>
             <a:endParaRPr lang="en-US"/>
           </a:p>
@@ -14834,7 +14834,7 @@
           <a:p>
             <a:fld id="{3782CE92-F9D3-4EB2-AD9D-26F7FF2DF595}" type="datetimeFigureOut">
               <a:rPr lang="en-US" smtClean="0"/>
-              <a:t>13-Sep-17</a:t>
+              <a:t>15-Sep-17</a:t>
             </a:fld>
             <a:endParaRPr lang="en-US"/>
           </a:p>
@@ -14952,7 +14952,7 @@
           <a:p>
             <a:fld id="{3782CE92-F9D3-4EB2-AD9D-26F7FF2DF595}" type="datetimeFigureOut">
               <a:rPr lang="en-US" smtClean="0"/>
-              <a:t>13-Sep-17</a:t>
+              <a:t>15-Sep-17</a:t>
             </a:fld>
             <a:endParaRPr lang="en-US"/>
           </a:p>
@@ -15047,7 +15047,7 @@
           <a:p>
             <a:fld id="{3782CE92-F9D3-4EB2-AD9D-26F7FF2DF595}" type="datetimeFigureOut">
               <a:rPr lang="en-US" smtClean="0"/>
-              <a:t>13-Sep-17</a:t>
+              <a:t>15-Sep-17</a:t>
             </a:fld>
             <a:endParaRPr lang="en-US"/>
           </a:p>
@@ -15324,7 +15324,7 @@
           <a:p>
             <a:fld id="{3782CE92-F9D3-4EB2-AD9D-26F7FF2DF595}" type="datetimeFigureOut">
               <a:rPr lang="en-US" smtClean="0"/>
-              <a:t>13-Sep-17</a:t>
+              <a:t>15-Sep-17</a:t>
             </a:fld>
             <a:endParaRPr lang="en-US"/>
           </a:p>
@@ -15510,7 +15510,7 @@
           <a:p>
             <a:fld id="{3782CE92-F9D3-4EB2-AD9D-26F7FF2DF595}" type="datetimeFigureOut">
               <a:rPr lang="en-US" smtClean="0"/>
-              <a:t>13-Sep-17</a:t>
+              <a:t>15-Sep-17</a:t>
             </a:fld>
             <a:endParaRPr lang="en-US"/>
           </a:p>
@@ -15779,7 +15779,7 @@
           <a:p>
             <a:fld id="{3782CE92-F9D3-4EB2-AD9D-26F7FF2DF595}" type="datetimeFigureOut">
               <a:rPr lang="en-US" smtClean="0"/>
-              <a:t>13-Sep-17</a:t>
+              <a:t>15-Sep-17</a:t>
             </a:fld>
             <a:endParaRPr lang="en-US"/>
           </a:p>
@@ -15949,7 +15949,7 @@
           <a:p>
             <a:fld id="{3782CE92-F9D3-4EB2-AD9D-26F7FF2DF595}" type="datetimeFigureOut">
               <a:rPr lang="en-US" smtClean="0"/>
-              <a:t>13-Sep-17</a:t>
+              <a:t>15-Sep-17</a:t>
             </a:fld>
             <a:endParaRPr lang="en-US"/>
           </a:p>
@@ -16129,7 +16129,7 @@
           <a:p>
             <a:fld id="{3782CE92-F9D3-4EB2-AD9D-26F7FF2DF595}" type="datetimeFigureOut">
               <a:rPr lang="en-US" smtClean="0"/>
-              <a:t>13-Sep-17</a:t>
+              <a:t>15-Sep-17</a:t>
             </a:fld>
             <a:endParaRPr lang="en-US"/>
           </a:p>
@@ -16321,7 +16321,7 @@
           <a:p>
             <a:fld id="{3782CE92-F9D3-4EB2-AD9D-26F7FF2DF595}" type="datetimeFigureOut">
               <a:rPr lang="en-US" smtClean="0"/>
-              <a:t>13-Sep-17</a:t>
+              <a:t>15-Sep-17</a:t>
             </a:fld>
             <a:endParaRPr lang="en-US"/>
           </a:p>
@@ -16491,7 +16491,7 @@
           <a:p>
             <a:fld id="{3782CE92-F9D3-4EB2-AD9D-26F7FF2DF595}" type="datetimeFigureOut">
               <a:rPr lang="en-US" smtClean="0"/>
-              <a:t>13-Sep-17</a:t>
+              <a:t>15-Sep-17</a:t>
             </a:fld>
             <a:endParaRPr lang="en-US"/>
           </a:p>
@@ -16737,7 +16737,7 @@
           <a:p>
             <a:fld id="{3782CE92-F9D3-4EB2-AD9D-26F7FF2DF595}" type="datetimeFigureOut">
               <a:rPr lang="en-US" smtClean="0"/>
-              <a:t>13-Sep-17</a:t>
+              <a:t>15-Sep-17</a:t>
             </a:fld>
             <a:endParaRPr lang="en-US"/>
           </a:p>
@@ -16969,7 +16969,7 @@
           <a:p>
             <a:fld id="{3782CE92-F9D3-4EB2-AD9D-26F7FF2DF595}" type="datetimeFigureOut">
               <a:rPr lang="en-US" smtClean="0"/>
-              <a:t>13-Sep-17</a:t>
+              <a:t>15-Sep-17</a:t>
             </a:fld>
             <a:endParaRPr lang="en-US"/>
           </a:p>
@@ -17336,7 +17336,7 @@
           <a:p>
             <a:fld id="{3782CE92-F9D3-4EB2-AD9D-26F7FF2DF595}" type="datetimeFigureOut">
               <a:rPr lang="en-US" smtClean="0"/>
-              <a:t>13-Sep-17</a:t>
+              <a:t>15-Sep-17</a:t>
             </a:fld>
             <a:endParaRPr lang="en-US"/>
           </a:p>
@@ -17454,7 +17454,7 @@
           <a:p>
             <a:fld id="{3782CE92-F9D3-4EB2-AD9D-26F7FF2DF595}" type="datetimeFigureOut">
               <a:rPr lang="en-US" smtClean="0"/>
-              <a:t>13-Sep-17</a:t>
+              <a:t>15-Sep-17</a:t>
             </a:fld>
             <a:endParaRPr lang="en-US"/>
           </a:p>
@@ -17549,7 +17549,7 @@
           <a:p>
             <a:fld id="{3782CE92-F9D3-4EB2-AD9D-26F7FF2DF595}" type="datetimeFigureOut">
               <a:rPr lang="en-US" smtClean="0"/>
-              <a:t>13-Sep-17</a:t>
+              <a:t>15-Sep-17</a:t>
             </a:fld>
             <a:endParaRPr lang="en-US"/>
           </a:p>
@@ -17812,7 +17812,7 @@
           <a:p>
             <a:fld id="{3782CE92-F9D3-4EB2-AD9D-26F7FF2DF595}" type="datetimeFigureOut">
               <a:rPr lang="en-US" smtClean="0"/>
-              <a:t>13-Sep-17</a:t>
+              <a:t>15-Sep-17</a:t>
             </a:fld>
             <a:endParaRPr lang="en-US"/>
           </a:p>
@@ -18101,7 +18101,7 @@
           <a:p>
             <a:fld id="{3782CE92-F9D3-4EB2-AD9D-26F7FF2DF595}" type="datetimeFigureOut">
               <a:rPr lang="en-US" smtClean="0"/>
-              <a:t>13-Sep-17</a:t>
+              <a:t>15-Sep-17</a:t>
             </a:fld>
             <a:endParaRPr lang="en-US"/>
           </a:p>
@@ -18358,7 +18358,7 @@
           <a:p>
             <a:fld id="{3782CE92-F9D3-4EB2-AD9D-26F7FF2DF595}" type="datetimeFigureOut">
               <a:rPr lang="en-US" smtClean="0"/>
-              <a:t>13-Sep-17</a:t>
+              <a:t>15-Sep-17</a:t>
             </a:fld>
             <a:endParaRPr lang="en-US"/>
           </a:p>
@@ -18528,7 +18528,7 @@
           <a:p>
             <a:fld id="{3782CE92-F9D3-4EB2-AD9D-26F7FF2DF595}" type="datetimeFigureOut">
               <a:rPr lang="en-US" smtClean="0"/>
-              <a:t>13-Sep-17</a:t>
+              <a:t>15-Sep-17</a:t>
             </a:fld>
             <a:endParaRPr lang="en-US"/>
           </a:p>
@@ -18708,7 +18708,7 @@
           <a:p>
             <a:fld id="{3782CE92-F9D3-4EB2-AD9D-26F7FF2DF595}" type="datetimeFigureOut">
               <a:rPr lang="en-US" smtClean="0"/>
-              <a:t>13-Sep-17</a:t>
+              <a:t>15-Sep-17</a:t>
             </a:fld>
             <a:endParaRPr lang="en-US"/>
           </a:p>
@@ -18961,7 +18961,7 @@
           <a:p>
             <a:fld id="{3782CE92-F9D3-4EB2-AD9D-26F7FF2DF595}" type="datetimeFigureOut">
               <a:rPr lang="en-US" smtClean="0"/>
-              <a:t>13-Sep-17</a:t>
+              <a:t>15-Sep-17</a:t>
             </a:fld>
             <a:endParaRPr lang="en-US"/>
           </a:p>
@@ -19373,7 +19373,7 @@
           <a:p>
             <a:fld id="{3782CE92-F9D3-4EB2-AD9D-26F7FF2DF595}" type="datetimeFigureOut">
               <a:rPr lang="en-US" smtClean="0"/>
-              <a:t>13-Sep-17</a:t>
+              <a:t>15-Sep-17</a:t>
             </a:fld>
             <a:endParaRPr lang="en-US"/>
           </a:p>
@@ -19514,7 +19514,7 @@
           <a:p>
             <a:fld id="{3782CE92-F9D3-4EB2-AD9D-26F7FF2DF595}" type="datetimeFigureOut">
               <a:rPr lang="en-US" smtClean="0"/>
-              <a:t>13-Sep-17</a:t>
+              <a:t>15-Sep-17</a:t>
             </a:fld>
             <a:endParaRPr lang="en-US"/>
           </a:p>
@@ -19627,7 +19627,7 @@
           <a:p>
             <a:fld id="{3782CE92-F9D3-4EB2-AD9D-26F7FF2DF595}" type="datetimeFigureOut">
               <a:rPr lang="en-US" smtClean="0"/>
-              <a:t>13-Sep-17</a:t>
+              <a:t>15-Sep-17</a:t>
             </a:fld>
             <a:endParaRPr lang="en-US"/>
           </a:p>
@@ -19938,7 +19938,7 @@
           <a:p>
             <a:fld id="{3782CE92-F9D3-4EB2-AD9D-26F7FF2DF595}" type="datetimeFigureOut">
               <a:rPr lang="en-US" smtClean="0"/>
-              <a:t>13-Sep-17</a:t>
+              <a:t>15-Sep-17</a:t>
             </a:fld>
             <a:endParaRPr lang="en-US"/>
           </a:p>
@@ -20226,7 +20226,7 @@
           <a:p>
             <a:fld id="{3782CE92-F9D3-4EB2-AD9D-26F7FF2DF595}" type="datetimeFigureOut">
               <a:rPr lang="en-US" smtClean="0"/>
-              <a:t>13-Sep-17</a:t>
+              <a:t>15-Sep-17</a:t>
             </a:fld>
             <a:endParaRPr lang="en-US"/>
           </a:p>
@@ -20467,7 +20467,7 @@
           <a:p>
             <a:fld id="{3782CE92-F9D3-4EB2-AD9D-26F7FF2DF595}" type="datetimeFigureOut">
               <a:rPr lang="en-US" smtClean="0"/>
-              <a:t>13-Sep-17</a:t>
+              <a:t>15-Sep-17</a:t>
             </a:fld>
             <a:endParaRPr lang="en-US"/>
           </a:p>
@@ -21019,7 +21019,7 @@
           <a:p>
             <a:fld id="{3782CE92-F9D3-4EB2-AD9D-26F7FF2DF595}" type="datetimeFigureOut">
               <a:rPr lang="en-US" smtClean="0"/>
-              <a:t>13-Sep-17</a:t>
+              <a:t>15-Sep-17</a:t>
             </a:fld>
             <a:endParaRPr lang="en-US"/>
           </a:p>
@@ -21559,7 +21559,7 @@
           <a:p>
             <a:fld id="{3782CE92-F9D3-4EB2-AD9D-26F7FF2DF595}" type="datetimeFigureOut">
               <a:rPr lang="en-US" smtClean="0"/>
-              <a:t>13-Sep-17</a:t>
+              <a:t>15-Sep-17</a:t>
             </a:fld>
             <a:endParaRPr lang="en-US"/>
           </a:p>
@@ -27654,6 +27654,44 @@
               <a:rPr lang="en-US" dirty="0"/>
               <a:t> for you.</a:t>
             </a:r>
+          </a:p>
+          <a:p>
+            <a:pPr marL="0" indent="0">
+              <a:buNone/>
+            </a:pPr>
+            <a:r>
+              <a:rPr lang="en-US" dirty="0"/>
+              <a:t>	</a:t>
+            </a:r>
+            <a:r>
+              <a:rPr lang="en-US" sz="2000" dirty="0"/>
+              <a:t>If you are creating a </a:t>
+            </a:r>
+            <a:r>
+              <a:rPr lang="en-US" sz="2000" b="1" dirty="0"/>
+              <a:t>.</a:t>
+            </a:r>
+            <a:r>
+              <a:rPr lang="en-US" sz="2000" b="1" dirty="0" err="1"/>
+              <a:t>gitignore</a:t>
+            </a:r>
+            <a:r>
+              <a:rPr lang="en-US" sz="2000" dirty="0"/>
+              <a:t> file on windows you have to name it “.</a:t>
+            </a:r>
+            <a:r>
+              <a:rPr lang="en-US" sz="2000" dirty="0" err="1"/>
+              <a:t>gitignore</a:t>
+            </a:r>
+            <a:r>
+              <a:rPr lang="en-US" sz="2000" dirty="0"/>
+              <a:t>.</a:t>
+            </a:r>
+            <a:r>
+              <a:rPr lang="en-US" sz="2400" dirty="0"/>
+              <a:t>”</a:t>
+            </a:r>
+            <a:endParaRPr lang="en-US" dirty="0"/>
           </a:p>
         </p:txBody>
       </p:sp>

</xml_diff>